<commit_message>
Importance of Data Science in Industry 4.0
</commit_message>
<xml_diff>
--- a/Webinar/16 Analytics Vidhya - Introduction to MLOps/Introduction to MLOps Anish Mahapatra.pptx
+++ b/Webinar/16 Analytics Vidhya - Introduction to MLOps/Introduction to MLOps Anish Mahapatra.pptx
@@ -287,7 +287,7 @@
           <a:p>
             <a:fld id="{FEC1E092-1ED1-4761-85D1-EEE54D1D70F3}" type="datetimeFigureOut">
               <a:rPr lang="en-US" smtClean="0"/>
-              <a:t>30-Jun-22</a:t>
+              <a:t>20-Jul-22</a:t>
             </a:fld>
             <a:endParaRPr lang="en-US" dirty="0"/>
           </a:p>
@@ -2422,7 +2422,7 @@
             <a:fld id="{93B45646-DC20-4B9A-BA6C-96B87E2ABB20}" type="datetimeFigureOut">
               <a:rPr lang="en-US" smtClean="0"/>
               <a:pPr/>
-              <a:t>30-Jun-22</a:t>
+              <a:t>20-Jul-22</a:t>
             </a:fld>
             <a:endParaRPr lang="en-US" dirty="0"/>
           </a:p>
@@ -2721,7 +2721,7 @@
             <a:fld id="{93B45646-DC20-4B9A-BA6C-96B87E2ABB20}" type="datetimeFigureOut">
               <a:rPr lang="en-US" smtClean="0"/>
               <a:pPr/>
-              <a:t>30-Jun-22</a:t>
+              <a:t>20-Jul-22</a:t>
             </a:fld>
             <a:endParaRPr lang="en-US" dirty="0"/>
           </a:p>
@@ -3009,7 +3009,7 @@
             <a:fld id="{93B45646-DC20-4B9A-BA6C-96B87E2ABB20}" type="datetimeFigureOut">
               <a:rPr lang="en-US" smtClean="0"/>
               <a:pPr/>
-              <a:t>30-Jun-22</a:t>
+              <a:t>20-Jul-22</a:t>
             </a:fld>
             <a:endParaRPr lang="en-US" dirty="0"/>
           </a:p>
@@ -3404,7 +3404,7 @@
             <a:fld id="{93B45646-DC20-4B9A-BA6C-96B87E2ABB20}" type="datetimeFigureOut">
               <a:rPr lang="en-US" smtClean="0"/>
               <a:pPr/>
-              <a:t>30-Jun-22</a:t>
+              <a:t>20-Jul-22</a:t>
             </a:fld>
             <a:endParaRPr lang="en-US" dirty="0"/>
           </a:p>
@@ -3953,7 +3953,7 @@
             <a:fld id="{93B45646-DC20-4B9A-BA6C-96B87E2ABB20}" type="datetimeFigureOut">
               <a:rPr lang="en-US" smtClean="0"/>
               <a:pPr/>
-              <a:t>30-Jun-22</a:t>
+              <a:t>20-Jul-22</a:t>
             </a:fld>
             <a:endParaRPr lang="en-US" dirty="0"/>
           </a:p>
@@ -4156,7 +4156,7 @@
             <a:fld id="{93B45646-DC20-4B9A-BA6C-96B87E2ABB20}" type="datetimeFigureOut">
               <a:rPr lang="en-US" smtClean="0"/>
               <a:pPr/>
-              <a:t>30-Jun-22</a:t>
+              <a:t>20-Jul-22</a:t>
             </a:fld>
             <a:endParaRPr lang="en-US" dirty="0"/>
           </a:p>
@@ -4316,7 +4316,7 @@
             <a:fld id="{93B45646-DC20-4B9A-BA6C-96B87E2ABB20}" type="datetimeFigureOut">
               <a:rPr lang="en-US" smtClean="0"/>
               <a:pPr/>
-              <a:t>30-Jun-22</a:t>
+              <a:t>20-Jul-22</a:t>
             </a:fld>
             <a:endParaRPr lang="en-US" dirty="0"/>
           </a:p>

</xml_diff>